<commit_message>
Added car list images to presentation
</commit_message>
<xml_diff>
--- a/Presentations/DD_presentation.pptx
+++ b/Presentations/DD_presentation.pptx
@@ -5,7 +5,7 @@
     <p:sldMasterId id="2147483648" r:id="rId1"/>
   </p:sldMasterIdLst>
   <p:notesMasterIdLst>
-    <p:notesMasterId r:id="rId11"/>
+    <p:notesMasterId r:id="rId15"/>
   </p:notesMasterIdLst>
   <p:sldIdLst>
     <p:sldId id="257" r:id="rId2"/>
@@ -15,8 +15,12 @@
     <p:sldId id="261" r:id="rId6"/>
     <p:sldId id="262" r:id="rId7"/>
     <p:sldId id="263" r:id="rId8"/>
-    <p:sldId id="265" r:id="rId9"/>
-    <p:sldId id="264" r:id="rId10"/>
+    <p:sldId id="266" r:id="rId9"/>
+    <p:sldId id="267" r:id="rId10"/>
+    <p:sldId id="268" r:id="rId11"/>
+    <p:sldId id="269" r:id="rId12"/>
+    <p:sldId id="265" r:id="rId13"/>
+    <p:sldId id="264" r:id="rId14"/>
   </p:sldIdLst>
   <p:sldSz cx="12192000" cy="6858000"/>
   <p:notesSz cx="6858000" cy="9144000"/>
@@ -115,6 +119,11 @@
       </a:defRPr>
     </a:lvl9pPr>
   </p:defaultTextStyle>
+  <p:extLst>
+    <p:ext uri="{EFAFB233-063F-42B5-8137-9DF3F51BA10A}">
+      <p15:sldGuideLst xmlns:p15="http://schemas.microsoft.com/office/powerpoint/2012/main"/>
+    </p:ext>
+  </p:extLst>
 </p:presentation>
 </file>
 
@@ -200,7 +209,7 @@
           <a:p>
             <a:fld id="{9680917B-0D73-B449-ADF3-AFFB95F10571}" type="datetimeFigureOut">
               <a:rPr lang="en-US" smtClean="0"/>
-              <a:t>12/13/16</a:t>
+              <a:t>12/14/16</a:t>
             </a:fld>
             <a:endParaRPr lang="en-US"/>
           </a:p>
@@ -599,7 +608,7 @@
           <a:p>
             <a:fld id="{D65729FC-7377-0547-A369-7D5CB21A6A2B}" type="datetimeFigureOut">
               <a:rPr lang="en-US" smtClean="0"/>
-              <a:t>12/13/16</a:t>
+              <a:t>12/14/16</a:t>
             </a:fld>
             <a:endParaRPr lang="en-US"/>
           </a:p>
@@ -769,7 +778,7 @@
           <a:p>
             <a:fld id="{D65729FC-7377-0547-A369-7D5CB21A6A2B}" type="datetimeFigureOut">
               <a:rPr lang="en-US" smtClean="0"/>
-              <a:t>12/13/16</a:t>
+              <a:t>12/14/16</a:t>
             </a:fld>
             <a:endParaRPr lang="en-US"/>
           </a:p>
@@ -949,7 +958,7 @@
           <a:p>
             <a:fld id="{D65729FC-7377-0547-A369-7D5CB21A6A2B}" type="datetimeFigureOut">
               <a:rPr lang="en-US" smtClean="0"/>
-              <a:t>12/13/16</a:t>
+              <a:t>12/14/16</a:t>
             </a:fld>
             <a:endParaRPr lang="en-US"/>
           </a:p>
@@ -1119,7 +1128,7 @@
           <a:p>
             <a:fld id="{D65729FC-7377-0547-A369-7D5CB21A6A2B}" type="datetimeFigureOut">
               <a:rPr lang="en-US" smtClean="0"/>
-              <a:t>12/13/16</a:t>
+              <a:t>12/14/16</a:t>
             </a:fld>
             <a:endParaRPr lang="en-US"/>
           </a:p>
@@ -1365,7 +1374,7 @@
           <a:p>
             <a:fld id="{D65729FC-7377-0547-A369-7D5CB21A6A2B}" type="datetimeFigureOut">
               <a:rPr lang="en-US" smtClean="0"/>
-              <a:t>12/13/16</a:t>
+              <a:t>12/14/16</a:t>
             </a:fld>
             <a:endParaRPr lang="en-US"/>
           </a:p>
@@ -1597,7 +1606,7 @@
           <a:p>
             <a:fld id="{D65729FC-7377-0547-A369-7D5CB21A6A2B}" type="datetimeFigureOut">
               <a:rPr lang="en-US" smtClean="0"/>
-              <a:t>12/13/16</a:t>
+              <a:t>12/14/16</a:t>
             </a:fld>
             <a:endParaRPr lang="en-US"/>
           </a:p>
@@ -1964,7 +1973,7 @@
           <a:p>
             <a:fld id="{D65729FC-7377-0547-A369-7D5CB21A6A2B}" type="datetimeFigureOut">
               <a:rPr lang="en-US" smtClean="0"/>
-              <a:t>12/13/16</a:t>
+              <a:t>12/14/16</a:t>
             </a:fld>
             <a:endParaRPr lang="en-US"/>
           </a:p>
@@ -2082,7 +2091,7 @@
           <a:p>
             <a:fld id="{D65729FC-7377-0547-A369-7D5CB21A6A2B}" type="datetimeFigureOut">
               <a:rPr lang="en-US" smtClean="0"/>
-              <a:t>12/13/16</a:t>
+              <a:t>12/14/16</a:t>
             </a:fld>
             <a:endParaRPr lang="en-US"/>
           </a:p>
@@ -2177,7 +2186,7 @@
           <a:p>
             <a:fld id="{D65729FC-7377-0547-A369-7D5CB21A6A2B}" type="datetimeFigureOut">
               <a:rPr lang="en-US" smtClean="0"/>
-              <a:t>12/13/16</a:t>
+              <a:t>12/14/16</a:t>
             </a:fld>
             <a:endParaRPr lang="en-US"/>
           </a:p>
@@ -2454,7 +2463,7 @@
           <a:p>
             <a:fld id="{D65729FC-7377-0547-A369-7D5CB21A6A2B}" type="datetimeFigureOut">
               <a:rPr lang="en-US" smtClean="0"/>
-              <a:t>12/13/16</a:t>
+              <a:t>12/14/16</a:t>
             </a:fld>
             <a:endParaRPr lang="en-US"/>
           </a:p>
@@ -2707,7 +2716,7 @@
           <a:p>
             <a:fld id="{D65729FC-7377-0547-A369-7D5CB21A6A2B}" type="datetimeFigureOut">
               <a:rPr lang="en-US" smtClean="0"/>
-              <a:t>12/13/16</a:t>
+              <a:t>12/14/16</a:t>
             </a:fld>
             <a:endParaRPr lang="en-US"/>
           </a:p>
@@ -2920,7 +2929,7 @@
           <a:p>
             <a:fld id="{D65729FC-7377-0547-A369-7D5CB21A6A2B}" type="datetimeFigureOut">
               <a:rPr lang="en-US" smtClean="0"/>
-              <a:t>12/13/16</a:t>
+              <a:t>12/14/16</a:t>
             </a:fld>
             <a:endParaRPr lang="en-US"/>
           </a:p>
@@ -3525,7 +3534,7 @@
           <a:p>
             <a:fld id="{1D7F627E-EA13-DB47-86A6-F904E9402158}" type="datetime1">
               <a:rPr lang="it-IT"/>
-              <a:t>13/12/16</a:t>
+              <a:t>14/12/16</a:t>
             </a:fld>
             <a:endParaRPr lang="en-US" dirty="0"/>
           </a:p>
@@ -3535,6 +3544,1209 @@
     <p:extLst>
       <p:ext uri="{BB962C8B-B14F-4D97-AF65-F5344CB8AC3E}">
         <p14:creationId xmlns:p14="http://schemas.microsoft.com/office/powerpoint/2010/main" val="1539640315"/>
+      </p:ext>
+    </p:extLst>
+  </p:cSld>
+  <p:clrMapOvr>
+    <a:masterClrMapping/>
+  </p:clrMapOvr>
+  <p:timing>
+    <p:tnLst>
+      <p:par>
+        <p:cTn id="1" dur="indefinite" restart="never" nodeType="tmRoot"/>
+      </p:par>
+    </p:tnLst>
+  </p:timing>
+</p:sld>
+</file>
+
+<file path=ppt/slides/slide10.xml><?xml version="1.0" encoding="utf-8"?>
+<p:sld xmlns:a="http://schemas.openxmlformats.org/drawingml/2006/main" xmlns:r="http://schemas.openxmlformats.org/officeDocument/2006/relationships" xmlns:p="http://schemas.openxmlformats.org/presentationml/2006/main">
+  <p:cSld>
+    <p:spTree>
+      <p:nvGrpSpPr>
+        <p:cNvPr id="1" name=""/>
+        <p:cNvGrpSpPr/>
+        <p:nvPr/>
+      </p:nvGrpSpPr>
+      <p:grpSpPr>
+        <a:xfrm>
+          <a:off x="0" y="0"/>
+          <a:ext cx="0" cy="0"/>
+          <a:chOff x="0" y="0"/>
+          <a:chExt cx="0" cy="0"/>
+        </a:xfrm>
+      </p:grpSpPr>
+      <p:sp>
+        <p:nvSpPr>
+          <p:cNvPr id="2" name="Title 1"/>
+          <p:cNvSpPr>
+            <a:spLocks noGrp="1"/>
+          </p:cNvSpPr>
+          <p:nvPr>
+            <p:ph type="title"/>
+          </p:nvPr>
+        </p:nvSpPr>
+        <p:spPr/>
+        <p:txBody>
+          <a:bodyPr/>
+          <a:lstStyle/>
+          <a:p>
+            <a:r>
+              <a:rPr lang="en-US" dirty="0"/>
+              <a:t>List </a:t>
+            </a:r>
+            <a:r>
+              <a:rPr lang="en-US" dirty="0" smtClean="0"/>
+              <a:t>all cars </a:t>
+            </a:r>
+            <a:r>
+              <a:rPr lang="en-US" dirty="0"/>
+              <a:t>in a given </a:t>
+            </a:r>
+            <a:r>
+              <a:rPr lang="en-US" dirty="0" smtClean="0"/>
+              <a:t>area – Step 3</a:t>
+            </a:r>
+            <a:endParaRPr lang="en-US" dirty="0"/>
+          </a:p>
+        </p:txBody>
+      </p:sp>
+      <p:pic>
+        <p:nvPicPr>
+          <p:cNvPr id="4" name="Content Placeholder 3"/>
+          <p:cNvPicPr>
+            <a:picLocks noGrp="1"/>
+          </p:cNvPicPr>
+          <p:nvPr>
+            <p:ph idx="1"/>
+          </p:nvPr>
+        </p:nvPicPr>
+        <p:blipFill>
+          <a:blip r:embed="rId2">
+            <a:extLst>
+              <a:ext uri="{28A0092B-C50C-407E-A947-70E740481C1C}">
+                <a14:useLocalDpi xmlns:a14="http://schemas.microsoft.com/office/drawing/2010/main" val="0"/>
+              </a:ext>
+            </a:extLst>
+          </a:blip>
+          <a:stretch>
+            <a:fillRect/>
+          </a:stretch>
+        </p:blipFill>
+        <p:spPr>
+          <a:xfrm>
+            <a:off x="3900000" y="1690688"/>
+            <a:ext cx="4392000" cy="4392000"/>
+          </a:xfrm>
+        </p:spPr>
+      </p:pic>
+    </p:spTree>
+    <p:extLst>
+      <p:ext uri="{BB962C8B-B14F-4D97-AF65-F5344CB8AC3E}">
+        <p14:creationId xmlns:p14="http://schemas.microsoft.com/office/powerpoint/2010/main" val="1538573739"/>
+      </p:ext>
+    </p:extLst>
+  </p:cSld>
+  <p:clrMapOvr>
+    <a:masterClrMapping/>
+  </p:clrMapOvr>
+</p:sld>
+</file>
+
+<file path=ppt/slides/slide11.xml><?xml version="1.0" encoding="utf-8"?>
+<p:sld xmlns:a="http://schemas.openxmlformats.org/drawingml/2006/main" xmlns:r="http://schemas.openxmlformats.org/officeDocument/2006/relationships" xmlns:p="http://schemas.openxmlformats.org/presentationml/2006/main">
+  <p:cSld>
+    <p:spTree>
+      <p:nvGrpSpPr>
+        <p:cNvPr id="1" name=""/>
+        <p:cNvGrpSpPr/>
+        <p:nvPr/>
+      </p:nvGrpSpPr>
+      <p:grpSpPr>
+        <a:xfrm>
+          <a:off x="0" y="0"/>
+          <a:ext cx="0" cy="0"/>
+          <a:chOff x="0" y="0"/>
+          <a:chExt cx="0" cy="0"/>
+        </a:xfrm>
+      </p:grpSpPr>
+      <p:sp>
+        <p:nvSpPr>
+          <p:cNvPr id="2" name="Title 1"/>
+          <p:cNvSpPr>
+            <a:spLocks noGrp="1"/>
+          </p:cNvSpPr>
+          <p:nvPr>
+            <p:ph type="title"/>
+          </p:nvPr>
+        </p:nvSpPr>
+        <p:spPr/>
+        <p:txBody>
+          <a:bodyPr/>
+          <a:lstStyle/>
+          <a:p>
+            <a:r>
+              <a:rPr lang="en-US" dirty="0"/>
+              <a:t>List </a:t>
+            </a:r>
+            <a:r>
+              <a:rPr lang="en-US" dirty="0" smtClean="0"/>
+              <a:t>all cars </a:t>
+            </a:r>
+            <a:r>
+              <a:rPr lang="en-US" dirty="0"/>
+              <a:t>in a given </a:t>
+            </a:r>
+            <a:r>
+              <a:rPr lang="en-US" dirty="0" smtClean="0"/>
+              <a:t>area – Step 4</a:t>
+            </a:r>
+            <a:endParaRPr lang="en-US" dirty="0"/>
+          </a:p>
+        </p:txBody>
+      </p:sp>
+      <p:pic>
+        <p:nvPicPr>
+          <p:cNvPr id="4" name="Content Placeholder 3"/>
+          <p:cNvPicPr>
+            <a:picLocks noGrp="1"/>
+          </p:cNvPicPr>
+          <p:nvPr>
+            <p:ph idx="1"/>
+          </p:nvPr>
+        </p:nvPicPr>
+        <p:blipFill>
+          <a:blip r:embed="rId2">
+            <a:extLst>
+              <a:ext uri="{28A0092B-C50C-407E-A947-70E740481C1C}">
+                <a14:useLocalDpi xmlns:a14="http://schemas.microsoft.com/office/drawing/2010/main" val="0"/>
+              </a:ext>
+            </a:extLst>
+          </a:blip>
+          <a:stretch>
+            <a:fillRect/>
+          </a:stretch>
+        </p:blipFill>
+        <p:spPr>
+          <a:xfrm>
+            <a:off x="3900000" y="1690688"/>
+            <a:ext cx="4392000" cy="4391417"/>
+          </a:xfrm>
+        </p:spPr>
+      </p:pic>
+    </p:spTree>
+    <p:extLst>
+      <p:ext uri="{BB962C8B-B14F-4D97-AF65-F5344CB8AC3E}">
+        <p14:creationId xmlns:p14="http://schemas.microsoft.com/office/powerpoint/2010/main" val="958237846"/>
+      </p:ext>
+    </p:extLst>
+  </p:cSld>
+  <p:clrMapOvr>
+    <a:masterClrMapping/>
+  </p:clrMapOvr>
+</p:sld>
+</file>
+
+<file path=ppt/slides/slide12.xml><?xml version="1.0" encoding="utf-8"?>
+<p:sld xmlns:a="http://schemas.openxmlformats.org/drawingml/2006/main" xmlns:r="http://schemas.openxmlformats.org/officeDocument/2006/relationships" xmlns:p="http://schemas.openxmlformats.org/presentationml/2006/main">
+  <p:cSld>
+    <p:spTree>
+      <p:nvGrpSpPr>
+        <p:cNvPr id="1" name=""/>
+        <p:cNvGrpSpPr/>
+        <p:nvPr/>
+      </p:nvGrpSpPr>
+      <p:grpSpPr>
+        <a:xfrm>
+          <a:off x="0" y="0"/>
+          <a:ext cx="0" cy="0"/>
+          <a:chOff x="0" y="0"/>
+          <a:chExt cx="0" cy="0"/>
+        </a:xfrm>
+      </p:grpSpPr>
+      <p:sp>
+        <p:nvSpPr>
+          <p:cNvPr id="2" name="Title 1"/>
+          <p:cNvSpPr>
+            <a:spLocks noGrp="1"/>
+          </p:cNvSpPr>
+          <p:nvPr>
+            <p:ph type="title"/>
+          </p:nvPr>
+        </p:nvSpPr>
+        <p:spPr>
+          <a:xfrm>
+            <a:off x="838200" y="365126"/>
+            <a:ext cx="10515600" cy="806449"/>
+          </a:xfrm>
+        </p:spPr>
+        <p:txBody>
+          <a:bodyPr/>
+          <a:lstStyle/>
+          <a:p>
+            <a:r>
+              <a:rPr lang="en-US" dirty="0" smtClean="0"/>
+              <a:t>List all cars in a given area</a:t>
+            </a:r>
+            <a:endParaRPr lang="en-US" dirty="0"/>
+          </a:p>
+        </p:txBody>
+      </p:sp>
+      <p:sp>
+        <p:nvSpPr>
+          <p:cNvPr id="3" name="Content Placeholder 2"/>
+          <p:cNvSpPr>
+            <a:spLocks noGrp="1"/>
+          </p:cNvSpPr>
+          <p:nvPr>
+            <p:ph idx="1"/>
+          </p:nvPr>
+        </p:nvSpPr>
+        <p:spPr>
+          <a:xfrm>
+            <a:off x="838200" y="1171574"/>
+            <a:ext cx="10515600" cy="5686426"/>
+          </a:xfrm>
+        </p:spPr>
+        <p:txBody>
+          <a:bodyPr>
+            <a:normAutofit fontScale="55000" lnSpcReduction="20000"/>
+          </a:bodyPr>
+          <a:lstStyle/>
+          <a:p>
+            <a:pPr marL="0" indent="0">
+              <a:lnSpc>
+                <a:spcPct val="120000"/>
+              </a:lnSpc>
+              <a:buNone/>
+            </a:pPr>
+            <a:r>
+              <a:rPr lang="en-US" b="1" dirty="0">
+                <a:solidFill>
+                  <a:srgbClr val="0070C0"/>
+                </a:solidFill>
+                <a:latin typeface="Lucida Console" charset="0"/>
+                <a:ea typeface="Lucida Console" charset="0"/>
+                <a:cs typeface="Lucida Console" charset="0"/>
+              </a:rPr>
+              <a:t>procedure</a:t>
+            </a:r>
+            <a:r>
+              <a:rPr lang="en-US" dirty="0">
+                <a:latin typeface="Lucida Console" charset="0"/>
+                <a:ea typeface="Lucida Console" charset="0"/>
+                <a:cs typeface="Lucida Console" charset="0"/>
+              </a:rPr>
+              <a:t> </a:t>
+            </a:r>
+            <a:r>
+              <a:rPr lang="en-US" dirty="0" err="1">
+                <a:latin typeface="Lucida Console" charset="0"/>
+                <a:ea typeface="Lucida Console" charset="0"/>
+                <a:cs typeface="Lucida Console" charset="0"/>
+              </a:rPr>
+              <a:t>QuadList</a:t>
+            </a:r>
+            <a:r>
+              <a:rPr lang="en-US" dirty="0">
+                <a:latin typeface="Lucida Console" charset="0"/>
+                <a:ea typeface="Lucida Console" charset="0"/>
+                <a:cs typeface="Lucida Console" charset="0"/>
+              </a:rPr>
+              <a:t>(S, X)</a:t>
+            </a:r>
+            <a:endParaRPr lang="en-US" b="0" dirty="0" smtClean="0">
+              <a:effectLst/>
+              <a:latin typeface="Lucida Console" charset="0"/>
+              <a:ea typeface="Lucida Console" charset="0"/>
+              <a:cs typeface="Lucida Console" charset="0"/>
+            </a:endParaRPr>
+          </a:p>
+          <a:p>
+            <a:pPr marL="0" indent="0">
+              <a:lnSpc>
+                <a:spcPct val="120000"/>
+              </a:lnSpc>
+              <a:buNone/>
+            </a:pPr>
+            <a:r>
+              <a:rPr lang="en-US" dirty="0">
+                <a:latin typeface="Lucida Console" charset="0"/>
+                <a:ea typeface="Lucida Console" charset="0"/>
+                <a:cs typeface="Lucida Console" charset="0"/>
+              </a:rPr>
+              <a:t>  </a:t>
+            </a:r>
+            <a:r>
+              <a:rPr lang="en-US" dirty="0">
+                <a:solidFill>
+                  <a:schemeClr val="accent6"/>
+                </a:solidFill>
+                <a:latin typeface="Lucida Console" charset="0"/>
+                <a:ea typeface="Lucida Console" charset="0"/>
+                <a:cs typeface="Lucida Console" charset="0"/>
+              </a:rPr>
+              <a:t>  </a:t>
+            </a:r>
+            <a:r>
+              <a:rPr lang="en-US" dirty="0" smtClean="0">
+                <a:solidFill>
+                  <a:schemeClr val="accent6"/>
+                </a:solidFill>
+                <a:latin typeface="Lucida Console" charset="0"/>
+                <a:ea typeface="Lucida Console" charset="0"/>
+                <a:cs typeface="Lucida Console" charset="0"/>
+              </a:rPr>
+              <a:t>// </a:t>
+            </a:r>
+            <a:r>
+              <a:rPr lang="en-US" dirty="0">
+                <a:solidFill>
+                  <a:schemeClr val="accent6"/>
+                </a:solidFill>
+                <a:latin typeface="Lucida Console" charset="0"/>
+                <a:ea typeface="Lucida Console" charset="0"/>
+                <a:cs typeface="Lucida Console" charset="0"/>
+              </a:rPr>
+              <a:t>S is the “query square”, that is: the interesting </a:t>
+            </a:r>
+            <a:r>
+              <a:rPr lang="en-US" dirty="0" smtClean="0">
+                <a:solidFill>
+                  <a:schemeClr val="accent6"/>
+                </a:solidFill>
+                <a:latin typeface="Lucida Console" charset="0"/>
+                <a:ea typeface="Lucida Console" charset="0"/>
+                <a:cs typeface="Lucida Console" charset="0"/>
+              </a:rPr>
+              <a:t>area</a:t>
+            </a:r>
+            <a:br>
+              <a:rPr lang="en-US" dirty="0" smtClean="0">
+                <a:solidFill>
+                  <a:schemeClr val="accent6"/>
+                </a:solidFill>
+                <a:latin typeface="Lucida Console" charset="0"/>
+                <a:ea typeface="Lucida Console" charset="0"/>
+                <a:cs typeface="Lucida Console" charset="0"/>
+              </a:rPr>
+            </a:br>
+            <a:r>
+              <a:rPr lang="en-US" dirty="0" smtClean="0">
+                <a:solidFill>
+                  <a:schemeClr val="accent6"/>
+                </a:solidFill>
+                <a:latin typeface="Lucida Console" charset="0"/>
+                <a:ea typeface="Lucida Console" charset="0"/>
+                <a:cs typeface="Lucida Console" charset="0"/>
+              </a:rPr>
+              <a:t>    // X is the root node, initially is set to root</a:t>
+            </a:r>
+            <a:r>
+              <a:rPr lang="en-US" dirty="0">
+                <a:latin typeface="Lucida Console" charset="0"/>
+                <a:ea typeface="Lucida Console" charset="0"/>
+                <a:cs typeface="Lucida Console" charset="0"/>
+              </a:rPr>
+              <a:t/>
+            </a:r>
+            <a:br>
+              <a:rPr lang="en-US" dirty="0">
+                <a:latin typeface="Lucida Console" charset="0"/>
+                <a:ea typeface="Lucida Console" charset="0"/>
+                <a:cs typeface="Lucida Console" charset="0"/>
+              </a:rPr>
+            </a:br>
+            <a:r>
+              <a:rPr lang="en-US" dirty="0">
+                <a:latin typeface="Lucida Console" charset="0"/>
+                <a:ea typeface="Lucida Console" charset="0"/>
+                <a:cs typeface="Lucida Console" charset="0"/>
+              </a:rPr>
+              <a:t>    </a:t>
+            </a:r>
+            <a:r>
+              <a:rPr lang="en-US" dirty="0" smtClean="0">
+                <a:latin typeface="Lucida Console" charset="0"/>
+                <a:ea typeface="Lucida Console" charset="0"/>
+                <a:cs typeface="Lucida Console" charset="0"/>
+              </a:rPr>
+              <a:t>answer </a:t>
+            </a:r>
+            <a:r>
+              <a:rPr lang="en-US" dirty="0">
+                <a:latin typeface="Lucida Console" charset="0"/>
+                <a:ea typeface="Lucida Console" charset="0"/>
+                <a:cs typeface="Lucida Console" charset="0"/>
+              </a:rPr>
+              <a:t>= [] </a:t>
+            </a:r>
+            <a:r>
+              <a:rPr lang="en-US" dirty="0" smtClean="0">
+                <a:solidFill>
+                  <a:schemeClr val="accent6"/>
+                </a:solidFill>
+                <a:latin typeface="Lucida Console" charset="0"/>
+                <a:ea typeface="Lucida Console" charset="0"/>
+                <a:cs typeface="Lucida Console" charset="0"/>
+              </a:rPr>
+              <a:t>// </a:t>
+            </a:r>
+            <a:r>
+              <a:rPr lang="en-US" dirty="0">
+                <a:solidFill>
+                  <a:schemeClr val="accent6"/>
+                </a:solidFill>
+                <a:latin typeface="Lucida Console" charset="0"/>
+                <a:ea typeface="Lucida Console" charset="0"/>
+                <a:cs typeface="Lucida Console" charset="0"/>
+              </a:rPr>
+              <a:t>empty list</a:t>
+            </a:r>
+            <a:endParaRPr lang="en-US" b="0" dirty="0" smtClean="0">
+              <a:solidFill>
+                <a:schemeClr val="accent6"/>
+              </a:solidFill>
+              <a:effectLst/>
+              <a:latin typeface="Lucida Console" charset="0"/>
+              <a:ea typeface="Lucida Console" charset="0"/>
+              <a:cs typeface="Lucida Console" charset="0"/>
+            </a:endParaRPr>
+          </a:p>
+          <a:p>
+            <a:pPr marL="0" indent="0">
+              <a:lnSpc>
+                <a:spcPct val="120000"/>
+              </a:lnSpc>
+              <a:buNone/>
+            </a:pPr>
+            <a:r>
+              <a:rPr lang="en-US" dirty="0">
+                <a:latin typeface="Lucida Console" charset="0"/>
+                <a:ea typeface="Lucida Console" charset="0"/>
+                <a:cs typeface="Lucida Console" charset="0"/>
+              </a:rPr>
+              <a:t>    Y = S ⋂ area(X) </a:t>
+            </a:r>
+            <a:r>
+              <a:rPr lang="en-US" dirty="0" smtClean="0">
+                <a:solidFill>
+                  <a:schemeClr val="accent6"/>
+                </a:solidFill>
+                <a:latin typeface="Lucida Console" charset="0"/>
+                <a:ea typeface="Lucida Console" charset="0"/>
+                <a:cs typeface="Lucida Console" charset="0"/>
+              </a:rPr>
+              <a:t>// </a:t>
+            </a:r>
+            <a:r>
+              <a:rPr lang="en-US" dirty="0">
+                <a:solidFill>
+                  <a:schemeClr val="accent6"/>
+                </a:solidFill>
+                <a:latin typeface="Lucida Console" charset="0"/>
+                <a:ea typeface="Lucida Console" charset="0"/>
+                <a:cs typeface="Lucida Console" charset="0"/>
+              </a:rPr>
+              <a:t>intersection between S and the area of </a:t>
+            </a:r>
+            <a:r>
+              <a:rPr lang="en-US" dirty="0" smtClean="0">
+                <a:solidFill>
+                  <a:schemeClr val="accent6"/>
+                </a:solidFill>
+                <a:latin typeface="Lucida Console" charset="0"/>
+                <a:ea typeface="Lucida Console" charset="0"/>
+                <a:cs typeface="Lucida Console" charset="0"/>
+              </a:rPr>
+              <a:t>X</a:t>
+            </a:r>
+            <a:endParaRPr lang="en-US" b="0" dirty="0" smtClean="0">
+              <a:solidFill>
+                <a:schemeClr val="accent6"/>
+              </a:solidFill>
+              <a:effectLst/>
+              <a:latin typeface="Lucida Console" charset="0"/>
+              <a:ea typeface="Lucida Console" charset="0"/>
+              <a:cs typeface="Lucida Console" charset="0"/>
+            </a:endParaRPr>
+          </a:p>
+          <a:p>
+            <a:pPr marL="0" indent="0">
+              <a:lnSpc>
+                <a:spcPct val="120000"/>
+              </a:lnSpc>
+              <a:buNone/>
+            </a:pPr>
+            <a:r>
+              <a:rPr lang="en-US" dirty="0">
+                <a:latin typeface="Lucida Console" charset="0"/>
+                <a:ea typeface="Lucida Console" charset="0"/>
+                <a:cs typeface="Lucida Console" charset="0"/>
+              </a:rPr>
+              <a:t>    </a:t>
+            </a:r>
+            <a:r>
+              <a:rPr lang="en-US" b="1" dirty="0">
+                <a:solidFill>
+                  <a:srgbClr val="0070C0"/>
+                </a:solidFill>
+                <a:latin typeface="Lucida Console" charset="0"/>
+                <a:ea typeface="Lucida Console" charset="0"/>
+                <a:cs typeface="Lucida Console" charset="0"/>
+              </a:rPr>
+              <a:t>if</a:t>
+            </a:r>
+            <a:r>
+              <a:rPr lang="en-US" dirty="0">
+                <a:latin typeface="Lucida Console" charset="0"/>
+                <a:ea typeface="Lucida Console" charset="0"/>
+                <a:cs typeface="Lucida Console" charset="0"/>
+              </a:rPr>
+              <a:t> Y ≠ ∅ </a:t>
+            </a:r>
+            <a:r>
+              <a:rPr lang="en-US" dirty="0" smtClean="0">
+                <a:solidFill>
+                  <a:schemeClr val="accent6"/>
+                </a:solidFill>
+                <a:latin typeface="Lucida Console" charset="0"/>
+                <a:ea typeface="Lucida Console" charset="0"/>
+                <a:cs typeface="Lucida Console" charset="0"/>
+              </a:rPr>
+              <a:t>// </a:t>
+            </a:r>
+            <a:r>
+              <a:rPr lang="en-US" dirty="0">
+                <a:solidFill>
+                  <a:schemeClr val="accent6"/>
+                </a:solidFill>
+                <a:latin typeface="Lucida Console" charset="0"/>
+                <a:ea typeface="Lucida Console" charset="0"/>
+                <a:cs typeface="Lucida Console" charset="0"/>
+              </a:rPr>
+              <a:t>non-empty intersection</a:t>
+            </a:r>
+            <a:endParaRPr lang="en-US" b="0" dirty="0" smtClean="0">
+              <a:solidFill>
+                <a:schemeClr val="accent6"/>
+              </a:solidFill>
+              <a:effectLst/>
+              <a:latin typeface="Lucida Console" charset="0"/>
+              <a:ea typeface="Lucida Console" charset="0"/>
+              <a:cs typeface="Lucida Console" charset="0"/>
+            </a:endParaRPr>
+          </a:p>
+          <a:p>
+            <a:pPr marL="0" indent="0">
+              <a:lnSpc>
+                <a:spcPct val="120000"/>
+              </a:lnSpc>
+              <a:buNone/>
+            </a:pPr>
+            <a:r>
+              <a:rPr lang="en-US" dirty="0">
+                <a:latin typeface="Lucida Console" charset="0"/>
+                <a:ea typeface="Lucida Console" charset="0"/>
+                <a:cs typeface="Lucida Console" charset="0"/>
+              </a:rPr>
+              <a:t>       </a:t>
+            </a:r>
+            <a:r>
+              <a:rPr lang="en-US" b="1" dirty="0">
+                <a:solidFill>
+                  <a:srgbClr val="0070C0"/>
+                </a:solidFill>
+                <a:latin typeface="Lucida Console" charset="0"/>
+                <a:ea typeface="Lucida Console" charset="0"/>
+                <a:cs typeface="Lucida Console" charset="0"/>
+              </a:rPr>
+              <a:t>if</a:t>
+            </a:r>
+            <a:r>
+              <a:rPr lang="en-US" dirty="0">
+                <a:latin typeface="Lucida Console" charset="0"/>
+                <a:ea typeface="Lucida Console" charset="0"/>
+                <a:cs typeface="Lucida Console" charset="0"/>
+              </a:rPr>
+              <a:t> X is a leaf</a:t>
+            </a:r>
+            <a:endParaRPr lang="en-US" b="0" dirty="0" smtClean="0">
+              <a:effectLst/>
+              <a:latin typeface="Lucida Console" charset="0"/>
+              <a:ea typeface="Lucida Console" charset="0"/>
+              <a:cs typeface="Lucida Console" charset="0"/>
+            </a:endParaRPr>
+          </a:p>
+          <a:p>
+            <a:pPr marL="0" indent="0">
+              <a:lnSpc>
+                <a:spcPct val="120000"/>
+              </a:lnSpc>
+              <a:buNone/>
+            </a:pPr>
+            <a:r>
+              <a:rPr lang="en-US" dirty="0">
+                <a:latin typeface="Lucida Console" charset="0"/>
+                <a:ea typeface="Lucida Console" charset="0"/>
+                <a:cs typeface="Lucida Console" charset="0"/>
+              </a:rPr>
+              <a:t>          answer += [all cars that are inside Y]   </a:t>
+            </a:r>
+            <a:r>
+              <a:rPr lang="en-US" dirty="0" smtClean="0">
+                <a:solidFill>
+                  <a:schemeClr val="accent6"/>
+                </a:solidFill>
+                <a:latin typeface="Lucida Console" charset="0"/>
+                <a:ea typeface="Lucida Console" charset="0"/>
+                <a:cs typeface="Lucida Console" charset="0"/>
+              </a:rPr>
+              <a:t>// </a:t>
+            </a:r>
+            <a:r>
+              <a:rPr lang="en-US" dirty="0">
+                <a:solidFill>
+                  <a:schemeClr val="accent6"/>
+                </a:solidFill>
+                <a:latin typeface="Lucida Console" charset="0"/>
+                <a:ea typeface="Lucida Console" charset="0"/>
+                <a:cs typeface="Lucida Console" charset="0"/>
+              </a:rPr>
+              <a:t>0 or 1 car</a:t>
+            </a:r>
+            <a:endParaRPr lang="en-US" b="0" dirty="0" smtClean="0">
+              <a:solidFill>
+                <a:schemeClr val="accent6"/>
+              </a:solidFill>
+              <a:effectLst/>
+              <a:latin typeface="Lucida Console" charset="0"/>
+              <a:ea typeface="Lucida Console" charset="0"/>
+              <a:cs typeface="Lucida Console" charset="0"/>
+            </a:endParaRPr>
+          </a:p>
+          <a:p>
+            <a:pPr marL="0" indent="0">
+              <a:lnSpc>
+                <a:spcPct val="120000"/>
+              </a:lnSpc>
+              <a:buNone/>
+            </a:pPr>
+            <a:r>
+              <a:rPr lang="en-US" dirty="0">
+                <a:latin typeface="Lucida Console" charset="0"/>
+                <a:ea typeface="Lucida Console" charset="0"/>
+                <a:cs typeface="Lucida Console" charset="0"/>
+              </a:rPr>
+              <a:t>       </a:t>
+            </a:r>
+            <a:r>
+              <a:rPr lang="en-US" b="1" dirty="0">
+                <a:solidFill>
+                  <a:srgbClr val="0070C0"/>
+                </a:solidFill>
+                <a:latin typeface="Lucida Console" charset="0"/>
+                <a:ea typeface="Lucida Console" charset="0"/>
+                <a:cs typeface="Lucida Console" charset="0"/>
+              </a:rPr>
+              <a:t>else</a:t>
+            </a:r>
+            <a:endParaRPr lang="en-US" b="1" dirty="0" smtClean="0">
+              <a:solidFill>
+                <a:srgbClr val="0070C0"/>
+              </a:solidFill>
+              <a:effectLst/>
+              <a:latin typeface="Lucida Console" charset="0"/>
+              <a:ea typeface="Lucida Console" charset="0"/>
+              <a:cs typeface="Lucida Console" charset="0"/>
+            </a:endParaRPr>
+          </a:p>
+          <a:p>
+            <a:pPr marL="0" indent="0">
+              <a:lnSpc>
+                <a:spcPct val="120000"/>
+              </a:lnSpc>
+              <a:buNone/>
+            </a:pPr>
+            <a:r>
+              <a:rPr lang="en-US" dirty="0">
+                <a:latin typeface="Lucida Console" charset="0"/>
+                <a:ea typeface="Lucida Console" charset="0"/>
+                <a:cs typeface="Lucida Console" charset="0"/>
+              </a:rPr>
+              <a:t>          answer += </a:t>
+            </a:r>
+            <a:r>
+              <a:rPr lang="en-US" dirty="0" err="1">
+                <a:latin typeface="Lucida Console" charset="0"/>
+                <a:ea typeface="Lucida Console" charset="0"/>
+                <a:cs typeface="Lucida Console" charset="0"/>
+              </a:rPr>
+              <a:t>QuadList</a:t>
+            </a:r>
+            <a:r>
+              <a:rPr lang="en-US" dirty="0">
+                <a:latin typeface="Lucida Console" charset="0"/>
+                <a:ea typeface="Lucida Console" charset="0"/>
+                <a:cs typeface="Lucida Console" charset="0"/>
+              </a:rPr>
+              <a:t>(S, top left of </a:t>
+            </a:r>
+            <a:r>
+              <a:rPr lang="en-US" dirty="0" smtClean="0">
+                <a:latin typeface="Lucida Console" charset="0"/>
+                <a:ea typeface="Lucida Console" charset="0"/>
+                <a:cs typeface="Lucida Console" charset="0"/>
+              </a:rPr>
+              <a:t>X)</a:t>
+            </a:r>
+            <a:r>
+              <a:rPr lang="en-US" dirty="0">
+                <a:latin typeface="Lucida Console" charset="0"/>
+                <a:ea typeface="Lucida Console" charset="0"/>
+                <a:cs typeface="Lucida Console" charset="0"/>
+              </a:rPr>
+              <a:t/>
+            </a:r>
+            <a:br>
+              <a:rPr lang="en-US" dirty="0">
+                <a:latin typeface="Lucida Console" charset="0"/>
+                <a:ea typeface="Lucida Console" charset="0"/>
+                <a:cs typeface="Lucida Console" charset="0"/>
+              </a:rPr>
+            </a:br>
+            <a:r>
+              <a:rPr lang="en-US" dirty="0">
+                <a:latin typeface="Lucida Console" charset="0"/>
+                <a:ea typeface="Lucida Console" charset="0"/>
+                <a:cs typeface="Lucida Console" charset="0"/>
+              </a:rPr>
+              <a:t> </a:t>
+            </a:r>
+            <a:r>
+              <a:rPr lang="en-US" dirty="0" smtClean="0">
+                <a:latin typeface="Lucida Console" charset="0"/>
+                <a:ea typeface="Lucida Console" charset="0"/>
+                <a:cs typeface="Lucida Console" charset="0"/>
+              </a:rPr>
+              <a:t>         answer </a:t>
+            </a:r>
+            <a:r>
+              <a:rPr lang="en-US" dirty="0">
+                <a:latin typeface="Lucida Console" charset="0"/>
+                <a:ea typeface="Lucida Console" charset="0"/>
+                <a:cs typeface="Lucida Console" charset="0"/>
+              </a:rPr>
+              <a:t>+= </a:t>
+            </a:r>
+            <a:r>
+              <a:rPr lang="en-US" dirty="0" err="1">
+                <a:latin typeface="Lucida Console" charset="0"/>
+                <a:ea typeface="Lucida Console" charset="0"/>
+                <a:cs typeface="Lucida Console" charset="0"/>
+              </a:rPr>
+              <a:t>QuadList</a:t>
+            </a:r>
+            <a:r>
+              <a:rPr lang="en-US" dirty="0">
+                <a:latin typeface="Lucida Console" charset="0"/>
+                <a:ea typeface="Lucida Console" charset="0"/>
+                <a:cs typeface="Lucida Console" charset="0"/>
+              </a:rPr>
+              <a:t>(S, top right of </a:t>
+            </a:r>
+            <a:r>
+              <a:rPr lang="en-US" dirty="0" smtClean="0">
+                <a:latin typeface="Lucida Console" charset="0"/>
+                <a:ea typeface="Lucida Console" charset="0"/>
+                <a:cs typeface="Lucida Console" charset="0"/>
+              </a:rPr>
+              <a:t>X)</a:t>
+            </a:r>
+            <a:r>
+              <a:rPr lang="en-US" dirty="0">
+                <a:latin typeface="Lucida Console" charset="0"/>
+                <a:ea typeface="Lucida Console" charset="0"/>
+                <a:cs typeface="Lucida Console" charset="0"/>
+              </a:rPr>
+              <a:t/>
+            </a:r>
+            <a:br>
+              <a:rPr lang="en-US" dirty="0">
+                <a:latin typeface="Lucida Console" charset="0"/>
+                <a:ea typeface="Lucida Console" charset="0"/>
+                <a:cs typeface="Lucida Console" charset="0"/>
+              </a:rPr>
+            </a:br>
+            <a:r>
+              <a:rPr lang="en-US" dirty="0" smtClean="0">
+                <a:latin typeface="Lucida Console" charset="0"/>
+                <a:ea typeface="Lucida Console" charset="0"/>
+                <a:cs typeface="Lucida Console" charset="0"/>
+              </a:rPr>
+              <a:t>          answer </a:t>
+            </a:r>
+            <a:r>
+              <a:rPr lang="en-US" dirty="0">
+                <a:latin typeface="Lucida Console" charset="0"/>
+                <a:ea typeface="Lucida Console" charset="0"/>
+                <a:cs typeface="Lucida Console" charset="0"/>
+              </a:rPr>
+              <a:t>+= </a:t>
+            </a:r>
+            <a:r>
+              <a:rPr lang="en-US" dirty="0" err="1">
+                <a:latin typeface="Lucida Console" charset="0"/>
+                <a:ea typeface="Lucida Console" charset="0"/>
+                <a:cs typeface="Lucida Console" charset="0"/>
+              </a:rPr>
+              <a:t>QuadList</a:t>
+            </a:r>
+            <a:r>
+              <a:rPr lang="en-US" dirty="0">
+                <a:latin typeface="Lucida Console" charset="0"/>
+                <a:ea typeface="Lucida Console" charset="0"/>
+                <a:cs typeface="Lucida Console" charset="0"/>
+              </a:rPr>
+              <a:t>(S, bottom left of </a:t>
+            </a:r>
+            <a:r>
+              <a:rPr lang="en-US" dirty="0" smtClean="0">
+                <a:latin typeface="Lucida Console" charset="0"/>
+                <a:ea typeface="Lucida Console" charset="0"/>
+                <a:cs typeface="Lucida Console" charset="0"/>
+              </a:rPr>
+              <a:t>X)</a:t>
+            </a:r>
+            <a:r>
+              <a:rPr lang="en-US" dirty="0">
+                <a:latin typeface="Lucida Console" charset="0"/>
+                <a:ea typeface="Lucida Console" charset="0"/>
+                <a:cs typeface="Lucida Console" charset="0"/>
+              </a:rPr>
+              <a:t/>
+            </a:r>
+            <a:br>
+              <a:rPr lang="en-US" dirty="0">
+                <a:latin typeface="Lucida Console" charset="0"/>
+                <a:ea typeface="Lucida Console" charset="0"/>
+                <a:cs typeface="Lucida Console" charset="0"/>
+              </a:rPr>
+            </a:br>
+            <a:r>
+              <a:rPr lang="en-US" dirty="0" smtClean="0">
+                <a:latin typeface="Lucida Console" charset="0"/>
+                <a:ea typeface="Lucida Console" charset="0"/>
+                <a:cs typeface="Lucida Console" charset="0"/>
+              </a:rPr>
+              <a:t>          answer </a:t>
+            </a:r>
+            <a:r>
+              <a:rPr lang="en-US" dirty="0">
+                <a:latin typeface="Lucida Console" charset="0"/>
+                <a:ea typeface="Lucida Console" charset="0"/>
+                <a:cs typeface="Lucida Console" charset="0"/>
+              </a:rPr>
+              <a:t>+= </a:t>
+            </a:r>
+            <a:r>
+              <a:rPr lang="en-US" dirty="0" err="1">
+                <a:latin typeface="Lucida Console" charset="0"/>
+                <a:ea typeface="Lucida Console" charset="0"/>
+                <a:cs typeface="Lucida Console" charset="0"/>
+              </a:rPr>
+              <a:t>QuadList</a:t>
+            </a:r>
+            <a:r>
+              <a:rPr lang="en-US" dirty="0">
+                <a:latin typeface="Lucida Console" charset="0"/>
+                <a:ea typeface="Lucida Console" charset="0"/>
+                <a:cs typeface="Lucida Console" charset="0"/>
+              </a:rPr>
+              <a:t>(S, bottom right of X)</a:t>
+            </a:r>
+            <a:endParaRPr lang="en-US" b="0" dirty="0" smtClean="0">
+              <a:effectLst/>
+              <a:latin typeface="Lucida Console" charset="0"/>
+              <a:ea typeface="Lucida Console" charset="0"/>
+              <a:cs typeface="Lucida Console" charset="0"/>
+            </a:endParaRPr>
+          </a:p>
+          <a:p>
+            <a:pPr marL="0" indent="0">
+              <a:lnSpc>
+                <a:spcPct val="120000"/>
+              </a:lnSpc>
+              <a:buNone/>
+            </a:pPr>
+            <a:r>
+              <a:rPr lang="en-US" dirty="0">
+                <a:latin typeface="Lucida Console" charset="0"/>
+                <a:ea typeface="Lucida Console" charset="0"/>
+                <a:cs typeface="Lucida Console" charset="0"/>
+              </a:rPr>
+              <a:t>       </a:t>
+            </a:r>
+            <a:r>
+              <a:rPr lang="en-US" b="1" dirty="0" err="1">
+                <a:solidFill>
+                  <a:srgbClr val="0070C0"/>
+                </a:solidFill>
+                <a:latin typeface="Lucida Console" charset="0"/>
+                <a:ea typeface="Lucida Console" charset="0"/>
+                <a:cs typeface="Lucida Console" charset="0"/>
+              </a:rPr>
+              <a:t>endif</a:t>
+            </a:r>
+            <a:endParaRPr lang="en-US" b="1" dirty="0" smtClean="0">
+              <a:solidFill>
+                <a:srgbClr val="0070C0"/>
+              </a:solidFill>
+              <a:effectLst/>
+              <a:latin typeface="Lucida Console" charset="0"/>
+              <a:ea typeface="Lucida Console" charset="0"/>
+              <a:cs typeface="Lucida Console" charset="0"/>
+            </a:endParaRPr>
+          </a:p>
+          <a:p>
+            <a:pPr marL="0" indent="0">
+              <a:lnSpc>
+                <a:spcPct val="120000"/>
+              </a:lnSpc>
+              <a:buNone/>
+            </a:pPr>
+            <a:r>
+              <a:rPr lang="en-US" dirty="0">
+                <a:latin typeface="Lucida Console" charset="0"/>
+                <a:ea typeface="Lucida Console" charset="0"/>
+                <a:cs typeface="Lucida Console" charset="0"/>
+              </a:rPr>
+              <a:t>    </a:t>
+            </a:r>
+            <a:r>
+              <a:rPr lang="en-US" b="1" dirty="0" err="1" smtClean="0">
+                <a:solidFill>
+                  <a:srgbClr val="0070C0"/>
+                </a:solidFill>
+                <a:latin typeface="Lucida Console" charset="0"/>
+                <a:ea typeface="Lucida Console" charset="0"/>
+                <a:cs typeface="Lucida Console" charset="0"/>
+              </a:rPr>
+              <a:t>endif</a:t>
+            </a:r>
+            <a:endParaRPr lang="en-US" b="1" dirty="0" smtClean="0">
+              <a:solidFill>
+                <a:srgbClr val="0070C0"/>
+              </a:solidFill>
+              <a:effectLst/>
+              <a:latin typeface="Lucida Console" charset="0"/>
+              <a:ea typeface="Lucida Console" charset="0"/>
+              <a:cs typeface="Lucida Console" charset="0"/>
+            </a:endParaRPr>
+          </a:p>
+          <a:p>
+            <a:pPr marL="0" indent="0">
+              <a:lnSpc>
+                <a:spcPct val="120000"/>
+              </a:lnSpc>
+              <a:buNone/>
+            </a:pPr>
+            <a:r>
+              <a:rPr lang="en-US" dirty="0">
+                <a:latin typeface="Lucida Console" charset="0"/>
+                <a:ea typeface="Lucida Console" charset="0"/>
+                <a:cs typeface="Lucida Console" charset="0"/>
+              </a:rPr>
+              <a:t>    </a:t>
+            </a:r>
+            <a:r>
+              <a:rPr lang="en-US" b="1" dirty="0">
+                <a:solidFill>
+                  <a:srgbClr val="0070C0"/>
+                </a:solidFill>
+                <a:latin typeface="Lucida Console" charset="0"/>
+                <a:ea typeface="Lucida Console" charset="0"/>
+                <a:cs typeface="Lucida Console" charset="0"/>
+              </a:rPr>
+              <a:t>return</a:t>
+            </a:r>
+            <a:r>
+              <a:rPr lang="en-US" dirty="0">
+                <a:latin typeface="Lucida Console" charset="0"/>
+                <a:ea typeface="Lucida Console" charset="0"/>
+                <a:cs typeface="Lucida Console" charset="0"/>
+              </a:rPr>
+              <a:t> </a:t>
+            </a:r>
+            <a:r>
+              <a:rPr lang="en-US" dirty="0" smtClean="0">
+                <a:latin typeface="Lucida Console" charset="0"/>
+                <a:ea typeface="Lucida Console" charset="0"/>
+                <a:cs typeface="Lucida Console" charset="0"/>
+              </a:rPr>
+              <a:t>answer</a:t>
+            </a:r>
+            <a:endParaRPr lang="en-US" dirty="0">
+              <a:latin typeface="Lucida Console" charset="0"/>
+              <a:ea typeface="Lucida Console" charset="0"/>
+              <a:cs typeface="Lucida Console" charset="0"/>
+            </a:endParaRPr>
+          </a:p>
+        </p:txBody>
+      </p:sp>
+    </p:spTree>
+    <p:extLst>
+      <p:ext uri="{BB962C8B-B14F-4D97-AF65-F5344CB8AC3E}">
+        <p14:creationId xmlns:p14="http://schemas.microsoft.com/office/powerpoint/2010/main" val="482448687"/>
+      </p:ext>
+    </p:extLst>
+  </p:cSld>
+  <p:clrMapOvr>
+    <a:masterClrMapping/>
+  </p:clrMapOvr>
+</p:sld>
+</file>
+
+<file path=ppt/slides/slide13.xml><?xml version="1.0" encoding="utf-8"?>
+<p:sld xmlns:a="http://schemas.openxmlformats.org/drawingml/2006/main" xmlns:r="http://schemas.openxmlformats.org/officeDocument/2006/relationships" xmlns:p="http://schemas.openxmlformats.org/presentationml/2006/main">
+  <p:cSld>
+    <p:spTree>
+      <p:nvGrpSpPr>
+        <p:cNvPr id="1" name=""/>
+        <p:cNvGrpSpPr/>
+        <p:nvPr/>
+      </p:nvGrpSpPr>
+      <p:grpSpPr>
+        <a:xfrm>
+          <a:off x="0" y="0"/>
+          <a:ext cx="0" cy="0"/>
+          <a:chOff x="0" y="0"/>
+          <a:chExt cx="0" cy="0"/>
+        </a:xfrm>
+      </p:grpSpPr>
+      <p:sp>
+        <p:nvSpPr>
+          <p:cNvPr id="2" name="Title 1"/>
+          <p:cNvSpPr>
+            <a:spLocks noGrp="1"/>
+          </p:cNvSpPr>
+          <p:nvPr>
+            <p:ph type="title"/>
+          </p:nvPr>
+        </p:nvSpPr>
+        <p:spPr>
+          <a:xfrm>
+            <a:off x="2152650" y="673470"/>
+            <a:ext cx="7886700" cy="1325563"/>
+          </a:xfrm>
+        </p:spPr>
+        <p:txBody>
+          <a:bodyPr/>
+          <a:lstStyle/>
+          <a:p>
+            <a:pPr algn="ctr"/>
+            <a:r>
+              <a:rPr lang="en-US" dirty="0" smtClean="0">
+                <a:latin typeface="Impact" charset="0"/>
+                <a:ea typeface="Impact" charset="0"/>
+                <a:cs typeface="Impact" charset="0"/>
+              </a:rPr>
+              <a:t>We’re done.</a:t>
+            </a:r>
+            <a:endParaRPr lang="en-US" dirty="0">
+              <a:latin typeface="Impact" charset="0"/>
+              <a:ea typeface="Impact" charset="0"/>
+              <a:cs typeface="Impact" charset="0"/>
+            </a:endParaRPr>
+          </a:p>
+        </p:txBody>
+      </p:sp>
+      <p:pic>
+        <p:nvPicPr>
+          <p:cNvPr id="8" name="Content Placeholder 7"/>
+          <p:cNvPicPr>
+            <a:picLocks noGrp="1" noChangeAspect="1"/>
+          </p:cNvPicPr>
+          <p:nvPr>
+            <p:ph idx="1"/>
+          </p:nvPr>
+        </p:nvPicPr>
+        <p:blipFill rotWithShape="1">
+          <a:blip r:embed="rId2">
+            <a:extLst>
+              <a:ext uri="{28A0092B-C50C-407E-A947-70E740481C1C}">
+                <a14:useLocalDpi xmlns:a14="http://schemas.microsoft.com/office/drawing/2010/main" val="0"/>
+              </a:ext>
+            </a:extLst>
+          </a:blip>
+          <a:srcRect b="18802"/>
+          <a:stretch/>
+        </p:blipFill>
+        <p:spPr>
+          <a:xfrm>
+            <a:off x="2614930" y="1690689"/>
+            <a:ext cx="6962140" cy="3533184"/>
+          </a:xfrm>
+        </p:spPr>
+      </p:pic>
+      <p:sp>
+        <p:nvSpPr>
+          <p:cNvPr id="9" name="Title 1"/>
+          <p:cNvSpPr txBox="1">
+            <a:spLocks/>
+          </p:cNvSpPr>
+          <p:nvPr/>
+        </p:nvSpPr>
+        <p:spPr>
+          <a:xfrm>
+            <a:off x="2152650" y="4972566"/>
+            <a:ext cx="7886700" cy="1325563"/>
+          </a:xfrm>
+          <a:prstGeom prst="rect">
+            <a:avLst/>
+          </a:prstGeom>
+        </p:spPr>
+        <p:txBody>
+          <a:bodyPr vert="horz" lIns="91440" tIns="45720" rIns="91440" bIns="45720" rtlCol="0" anchor="ctr">
+            <a:normAutofit/>
+          </a:bodyPr>
+          <a:lstStyle>
+            <a:lvl1pPr algn="l" defTabSz="914400" rtl="0" eaLnBrk="1" latinLnBrk="0" hangingPunct="1">
+              <a:lnSpc>
+                <a:spcPct val="90000"/>
+              </a:lnSpc>
+              <a:spcBef>
+                <a:spcPct val="0"/>
+              </a:spcBef>
+              <a:buNone/>
+              <a:defRPr sz="4400" kern="1200">
+                <a:solidFill>
+                  <a:schemeClr val="tx1"/>
+                </a:solidFill>
+                <a:latin typeface="+mj-lt"/>
+                <a:ea typeface="+mj-ea"/>
+                <a:cs typeface="+mj-cs"/>
+              </a:defRPr>
+            </a:lvl1pPr>
+          </a:lstStyle>
+          <a:p>
+            <a:pPr algn="ctr"/>
+            <a:r>
+              <a:rPr lang="en-US" dirty="0">
+                <a:latin typeface="Impact" charset="0"/>
+                <a:ea typeface="Impact" charset="0"/>
+                <a:cs typeface="Impact" charset="0"/>
+              </a:rPr>
+              <a:t>Any questions?</a:t>
+            </a:r>
+          </a:p>
+        </p:txBody>
+      </p:sp>
+    </p:spTree>
+    <p:extLst>
+      <p:ext uri="{BB962C8B-B14F-4D97-AF65-F5344CB8AC3E}">
+        <p14:creationId xmlns:p14="http://schemas.microsoft.com/office/powerpoint/2010/main" val="1382357205"/>
       </p:ext>
     </p:extLst>
   </p:cSld>
@@ -5056,841 +6268,52 @@
             <p:ph type="title"/>
           </p:nvPr>
         </p:nvSpPr>
+        <p:spPr/>
+        <p:txBody>
+          <a:bodyPr/>
+          <a:lstStyle/>
+          <a:p>
+            <a:r>
+              <a:rPr lang="en-US" dirty="0" smtClean="0"/>
+              <a:t>List all cars in a given area – Step 1</a:t>
+            </a:r>
+            <a:endParaRPr lang="en-US" dirty="0"/>
+          </a:p>
+        </p:txBody>
+      </p:sp>
+      <p:pic>
+        <p:nvPicPr>
+          <p:cNvPr id="4" name="Content Placeholder 3"/>
+          <p:cNvPicPr>
+            <a:picLocks noGrp="1" noChangeAspect="1"/>
+          </p:cNvPicPr>
+          <p:nvPr>
+            <p:ph idx="1"/>
+          </p:nvPr>
+        </p:nvPicPr>
+        <p:blipFill>
+          <a:blip r:embed="rId2">
+            <a:extLst>
+              <a:ext uri="{28A0092B-C50C-407E-A947-70E740481C1C}">
+                <a14:useLocalDpi xmlns:a14="http://schemas.microsoft.com/office/drawing/2010/main" val="0"/>
+              </a:ext>
+            </a:extLst>
+          </a:blip>
+          <a:stretch>
+            <a:fillRect/>
+          </a:stretch>
+        </p:blipFill>
         <p:spPr>
           <a:xfrm>
-            <a:off x="838200" y="365126"/>
-            <a:ext cx="10515600" cy="806449"/>
+            <a:off x="3899916" y="1690688"/>
+            <a:ext cx="4392168" cy="4392168"/>
           </a:xfrm>
         </p:spPr>
-        <p:txBody>
-          <a:bodyPr/>
-          <a:lstStyle/>
-          <a:p>
-            <a:r>
-              <a:rPr lang="en-US" dirty="0" smtClean="0"/>
-              <a:t>List all cars in a given area</a:t>
-            </a:r>
-            <a:endParaRPr lang="en-US" dirty="0"/>
-          </a:p>
-        </p:txBody>
-      </p:sp>
-      <p:sp>
-        <p:nvSpPr>
-          <p:cNvPr id="3" name="Content Placeholder 2"/>
-          <p:cNvSpPr>
-            <a:spLocks noGrp="1"/>
-          </p:cNvSpPr>
-          <p:nvPr>
-            <p:ph idx="1"/>
-          </p:nvPr>
-        </p:nvSpPr>
-        <p:spPr>
-          <a:xfrm>
-            <a:off x="838200" y="1171574"/>
-            <a:ext cx="10515600" cy="5686426"/>
-          </a:xfrm>
-        </p:spPr>
-        <p:txBody>
-          <a:bodyPr>
-            <a:normAutofit fontScale="55000" lnSpcReduction="20000"/>
-          </a:bodyPr>
-          <a:lstStyle/>
-          <a:p>
-            <a:pPr marL="0" indent="0">
-              <a:lnSpc>
-                <a:spcPct val="120000"/>
-              </a:lnSpc>
-              <a:buNone/>
-            </a:pPr>
-            <a:r>
-              <a:rPr lang="en-US" b="1" dirty="0">
-                <a:solidFill>
-                  <a:srgbClr val="0070C0"/>
-                </a:solidFill>
-                <a:latin typeface="Lucida Console" charset="0"/>
-                <a:ea typeface="Lucida Console" charset="0"/>
-                <a:cs typeface="Lucida Console" charset="0"/>
-              </a:rPr>
-              <a:t>procedure</a:t>
-            </a:r>
-            <a:r>
-              <a:rPr lang="en-US" dirty="0">
-                <a:latin typeface="Lucida Console" charset="0"/>
-                <a:ea typeface="Lucida Console" charset="0"/>
-                <a:cs typeface="Lucida Console" charset="0"/>
-              </a:rPr>
-              <a:t> </a:t>
-            </a:r>
-            <a:r>
-              <a:rPr lang="en-US" dirty="0" err="1">
-                <a:latin typeface="Lucida Console" charset="0"/>
-                <a:ea typeface="Lucida Console" charset="0"/>
-                <a:cs typeface="Lucida Console" charset="0"/>
-              </a:rPr>
-              <a:t>QuadList</a:t>
-            </a:r>
-            <a:r>
-              <a:rPr lang="en-US" dirty="0">
-                <a:latin typeface="Lucida Console" charset="0"/>
-                <a:ea typeface="Lucida Console" charset="0"/>
-                <a:cs typeface="Lucida Console" charset="0"/>
-              </a:rPr>
-              <a:t>(S, X)</a:t>
-            </a:r>
-            <a:endParaRPr lang="en-US" b="0" dirty="0" smtClean="0">
-              <a:effectLst/>
-              <a:latin typeface="Lucida Console" charset="0"/>
-              <a:ea typeface="Lucida Console" charset="0"/>
-              <a:cs typeface="Lucida Console" charset="0"/>
-            </a:endParaRPr>
-          </a:p>
-          <a:p>
-            <a:pPr marL="0" indent="0">
-              <a:lnSpc>
-                <a:spcPct val="120000"/>
-              </a:lnSpc>
-              <a:buNone/>
-            </a:pPr>
-            <a:r>
-              <a:rPr lang="en-US" dirty="0">
-                <a:latin typeface="Lucida Console" charset="0"/>
-                <a:ea typeface="Lucida Console" charset="0"/>
-                <a:cs typeface="Lucida Console" charset="0"/>
-              </a:rPr>
-              <a:t>  </a:t>
-            </a:r>
-            <a:r>
-              <a:rPr lang="en-US" dirty="0">
-                <a:solidFill>
-                  <a:schemeClr val="accent6"/>
-                </a:solidFill>
-                <a:latin typeface="Lucida Console" charset="0"/>
-                <a:ea typeface="Lucida Console" charset="0"/>
-                <a:cs typeface="Lucida Console" charset="0"/>
-              </a:rPr>
-              <a:t>  </a:t>
-            </a:r>
-            <a:r>
-              <a:rPr lang="en-US" dirty="0" smtClean="0">
-                <a:solidFill>
-                  <a:schemeClr val="accent6"/>
-                </a:solidFill>
-                <a:latin typeface="Lucida Console" charset="0"/>
-                <a:ea typeface="Lucida Console" charset="0"/>
-                <a:cs typeface="Lucida Console" charset="0"/>
-              </a:rPr>
-              <a:t>// </a:t>
-            </a:r>
-            <a:r>
-              <a:rPr lang="en-US" dirty="0">
-                <a:solidFill>
-                  <a:schemeClr val="accent6"/>
-                </a:solidFill>
-                <a:latin typeface="Lucida Console" charset="0"/>
-                <a:ea typeface="Lucida Console" charset="0"/>
-                <a:cs typeface="Lucida Console" charset="0"/>
-              </a:rPr>
-              <a:t>S is the “query square”, that is: the interesting </a:t>
-            </a:r>
-            <a:r>
-              <a:rPr lang="en-US" dirty="0" smtClean="0">
-                <a:solidFill>
-                  <a:schemeClr val="accent6"/>
-                </a:solidFill>
-                <a:latin typeface="Lucida Console" charset="0"/>
-                <a:ea typeface="Lucida Console" charset="0"/>
-                <a:cs typeface="Lucida Console" charset="0"/>
-              </a:rPr>
-              <a:t>area</a:t>
-            </a:r>
-            <a:br>
-              <a:rPr lang="en-US" dirty="0" smtClean="0">
-                <a:solidFill>
-                  <a:schemeClr val="accent6"/>
-                </a:solidFill>
-                <a:latin typeface="Lucida Console" charset="0"/>
-                <a:ea typeface="Lucida Console" charset="0"/>
-                <a:cs typeface="Lucida Console" charset="0"/>
-              </a:rPr>
-            </a:br>
-            <a:r>
-              <a:rPr lang="en-US" dirty="0" smtClean="0">
-                <a:solidFill>
-                  <a:schemeClr val="accent6"/>
-                </a:solidFill>
-                <a:latin typeface="Lucida Console" charset="0"/>
-                <a:ea typeface="Lucida Console" charset="0"/>
-                <a:cs typeface="Lucida Console" charset="0"/>
-              </a:rPr>
-              <a:t>    // </a:t>
-            </a:r>
-            <a:r>
-              <a:rPr lang="en-US" dirty="0" smtClean="0">
-                <a:solidFill>
-                  <a:schemeClr val="accent6"/>
-                </a:solidFill>
-                <a:latin typeface="Lucida Console" charset="0"/>
-                <a:ea typeface="Lucida Console" charset="0"/>
-                <a:cs typeface="Lucida Console" charset="0"/>
-              </a:rPr>
-              <a:t>X is the root node, initially is set to root</a:t>
-            </a:r>
-            <a:r>
-              <a:rPr lang="en-US" dirty="0">
-                <a:latin typeface="Lucida Console" charset="0"/>
-                <a:ea typeface="Lucida Console" charset="0"/>
-                <a:cs typeface="Lucida Console" charset="0"/>
-              </a:rPr>
-              <a:t/>
-            </a:r>
-            <a:br>
-              <a:rPr lang="en-US" dirty="0">
-                <a:latin typeface="Lucida Console" charset="0"/>
-                <a:ea typeface="Lucida Console" charset="0"/>
-                <a:cs typeface="Lucida Console" charset="0"/>
-              </a:rPr>
-            </a:br>
-            <a:r>
-              <a:rPr lang="en-US" dirty="0">
-                <a:latin typeface="Lucida Console" charset="0"/>
-                <a:ea typeface="Lucida Console" charset="0"/>
-                <a:cs typeface="Lucida Console" charset="0"/>
-              </a:rPr>
-              <a:t>    </a:t>
-            </a:r>
-            <a:r>
-              <a:rPr lang="en-US" dirty="0" smtClean="0">
-                <a:latin typeface="Lucida Console" charset="0"/>
-                <a:ea typeface="Lucida Console" charset="0"/>
-                <a:cs typeface="Lucida Console" charset="0"/>
-              </a:rPr>
-              <a:t>answer </a:t>
-            </a:r>
-            <a:r>
-              <a:rPr lang="en-US" dirty="0">
-                <a:latin typeface="Lucida Console" charset="0"/>
-                <a:ea typeface="Lucida Console" charset="0"/>
-                <a:cs typeface="Lucida Console" charset="0"/>
-              </a:rPr>
-              <a:t>= [] </a:t>
-            </a:r>
-            <a:r>
-              <a:rPr lang="en-US" dirty="0" smtClean="0">
-                <a:solidFill>
-                  <a:schemeClr val="accent6"/>
-                </a:solidFill>
-                <a:latin typeface="Lucida Console" charset="0"/>
-                <a:ea typeface="Lucida Console" charset="0"/>
-                <a:cs typeface="Lucida Console" charset="0"/>
-              </a:rPr>
-              <a:t>// </a:t>
-            </a:r>
-            <a:r>
-              <a:rPr lang="en-US" dirty="0">
-                <a:solidFill>
-                  <a:schemeClr val="accent6"/>
-                </a:solidFill>
-                <a:latin typeface="Lucida Console" charset="0"/>
-                <a:ea typeface="Lucida Console" charset="0"/>
-                <a:cs typeface="Lucida Console" charset="0"/>
-              </a:rPr>
-              <a:t>empty list</a:t>
-            </a:r>
-            <a:endParaRPr lang="en-US" b="0" dirty="0" smtClean="0">
-              <a:solidFill>
-                <a:schemeClr val="accent6"/>
-              </a:solidFill>
-              <a:effectLst/>
-              <a:latin typeface="Lucida Console" charset="0"/>
-              <a:ea typeface="Lucida Console" charset="0"/>
-              <a:cs typeface="Lucida Console" charset="0"/>
-            </a:endParaRPr>
-          </a:p>
-          <a:p>
-            <a:pPr marL="0" indent="0">
-              <a:lnSpc>
-                <a:spcPct val="120000"/>
-              </a:lnSpc>
-              <a:buNone/>
-            </a:pPr>
-            <a:r>
-              <a:rPr lang="en-US" dirty="0">
-                <a:latin typeface="Lucida Console" charset="0"/>
-                <a:ea typeface="Lucida Console" charset="0"/>
-                <a:cs typeface="Lucida Console" charset="0"/>
-              </a:rPr>
-              <a:t>    Y = S ⋂ area(X) </a:t>
-            </a:r>
-            <a:r>
-              <a:rPr lang="en-US" dirty="0" smtClean="0">
-                <a:solidFill>
-                  <a:schemeClr val="accent6"/>
-                </a:solidFill>
-                <a:latin typeface="Lucida Console" charset="0"/>
-                <a:ea typeface="Lucida Console" charset="0"/>
-                <a:cs typeface="Lucida Console" charset="0"/>
-              </a:rPr>
-              <a:t>// </a:t>
-            </a:r>
-            <a:r>
-              <a:rPr lang="en-US" dirty="0">
-                <a:solidFill>
-                  <a:schemeClr val="accent6"/>
-                </a:solidFill>
-                <a:latin typeface="Lucida Console" charset="0"/>
-                <a:ea typeface="Lucida Console" charset="0"/>
-                <a:cs typeface="Lucida Console" charset="0"/>
-              </a:rPr>
-              <a:t>intersection between S and the area of </a:t>
-            </a:r>
-            <a:r>
-              <a:rPr lang="en-US" dirty="0" smtClean="0">
-                <a:solidFill>
-                  <a:schemeClr val="accent6"/>
-                </a:solidFill>
-                <a:latin typeface="Lucida Console" charset="0"/>
-                <a:ea typeface="Lucida Console" charset="0"/>
-                <a:cs typeface="Lucida Console" charset="0"/>
-              </a:rPr>
-              <a:t>X</a:t>
-            </a:r>
-            <a:endParaRPr lang="en-US" b="0" dirty="0" smtClean="0">
-              <a:solidFill>
-                <a:schemeClr val="accent6"/>
-              </a:solidFill>
-              <a:effectLst/>
-              <a:latin typeface="Lucida Console" charset="0"/>
-              <a:ea typeface="Lucida Console" charset="0"/>
-              <a:cs typeface="Lucida Console" charset="0"/>
-            </a:endParaRPr>
-          </a:p>
-          <a:p>
-            <a:pPr marL="0" indent="0">
-              <a:lnSpc>
-                <a:spcPct val="120000"/>
-              </a:lnSpc>
-              <a:buNone/>
-            </a:pPr>
-            <a:r>
-              <a:rPr lang="en-US" dirty="0">
-                <a:latin typeface="Lucida Console" charset="0"/>
-                <a:ea typeface="Lucida Console" charset="0"/>
-                <a:cs typeface="Lucida Console" charset="0"/>
-              </a:rPr>
-              <a:t>    </a:t>
-            </a:r>
-            <a:r>
-              <a:rPr lang="en-US" b="1" dirty="0">
-                <a:solidFill>
-                  <a:srgbClr val="0070C0"/>
-                </a:solidFill>
-                <a:latin typeface="Lucida Console" charset="0"/>
-                <a:ea typeface="Lucida Console" charset="0"/>
-                <a:cs typeface="Lucida Console" charset="0"/>
-              </a:rPr>
-              <a:t>if</a:t>
-            </a:r>
-            <a:r>
-              <a:rPr lang="en-US" dirty="0">
-                <a:latin typeface="Lucida Console" charset="0"/>
-                <a:ea typeface="Lucida Console" charset="0"/>
-                <a:cs typeface="Lucida Console" charset="0"/>
-              </a:rPr>
-              <a:t> Y ≠ ∅ </a:t>
-            </a:r>
-            <a:r>
-              <a:rPr lang="en-US" dirty="0" smtClean="0">
-                <a:solidFill>
-                  <a:schemeClr val="accent6"/>
-                </a:solidFill>
-                <a:latin typeface="Lucida Console" charset="0"/>
-                <a:ea typeface="Lucida Console" charset="0"/>
-                <a:cs typeface="Lucida Console" charset="0"/>
-              </a:rPr>
-              <a:t>// </a:t>
-            </a:r>
-            <a:r>
-              <a:rPr lang="en-US" dirty="0">
-                <a:solidFill>
-                  <a:schemeClr val="accent6"/>
-                </a:solidFill>
-                <a:latin typeface="Lucida Console" charset="0"/>
-                <a:ea typeface="Lucida Console" charset="0"/>
-                <a:cs typeface="Lucida Console" charset="0"/>
-              </a:rPr>
-              <a:t>non-empty intersection</a:t>
-            </a:r>
-            <a:endParaRPr lang="en-US" b="0" dirty="0" smtClean="0">
-              <a:solidFill>
-                <a:schemeClr val="accent6"/>
-              </a:solidFill>
-              <a:effectLst/>
-              <a:latin typeface="Lucida Console" charset="0"/>
-              <a:ea typeface="Lucida Console" charset="0"/>
-              <a:cs typeface="Lucida Console" charset="0"/>
-            </a:endParaRPr>
-          </a:p>
-          <a:p>
-            <a:pPr marL="0" indent="0">
-              <a:lnSpc>
-                <a:spcPct val="120000"/>
-              </a:lnSpc>
-              <a:buNone/>
-            </a:pPr>
-            <a:r>
-              <a:rPr lang="en-US" dirty="0">
-                <a:latin typeface="Lucida Console" charset="0"/>
-                <a:ea typeface="Lucida Console" charset="0"/>
-                <a:cs typeface="Lucida Console" charset="0"/>
-              </a:rPr>
-              <a:t>       </a:t>
-            </a:r>
-            <a:r>
-              <a:rPr lang="en-US" b="1" dirty="0">
-                <a:solidFill>
-                  <a:srgbClr val="0070C0"/>
-                </a:solidFill>
-                <a:latin typeface="Lucida Console" charset="0"/>
-                <a:ea typeface="Lucida Console" charset="0"/>
-                <a:cs typeface="Lucida Console" charset="0"/>
-              </a:rPr>
-              <a:t>if</a:t>
-            </a:r>
-            <a:r>
-              <a:rPr lang="en-US" dirty="0">
-                <a:latin typeface="Lucida Console" charset="0"/>
-                <a:ea typeface="Lucida Console" charset="0"/>
-                <a:cs typeface="Lucida Console" charset="0"/>
-              </a:rPr>
-              <a:t> X is a leaf</a:t>
-            </a:r>
-            <a:endParaRPr lang="en-US" b="0" dirty="0" smtClean="0">
-              <a:effectLst/>
-              <a:latin typeface="Lucida Console" charset="0"/>
-              <a:ea typeface="Lucida Console" charset="0"/>
-              <a:cs typeface="Lucida Console" charset="0"/>
-            </a:endParaRPr>
-          </a:p>
-          <a:p>
-            <a:pPr marL="0" indent="0">
-              <a:lnSpc>
-                <a:spcPct val="120000"/>
-              </a:lnSpc>
-              <a:buNone/>
-            </a:pPr>
-            <a:r>
-              <a:rPr lang="en-US" dirty="0">
-                <a:latin typeface="Lucida Console" charset="0"/>
-                <a:ea typeface="Lucida Console" charset="0"/>
-                <a:cs typeface="Lucida Console" charset="0"/>
-              </a:rPr>
-              <a:t>          answer += [all cars that are inside Y]   </a:t>
-            </a:r>
-            <a:r>
-              <a:rPr lang="en-US" dirty="0" smtClean="0">
-                <a:solidFill>
-                  <a:schemeClr val="accent6"/>
-                </a:solidFill>
-                <a:latin typeface="Lucida Console" charset="0"/>
-                <a:ea typeface="Lucida Console" charset="0"/>
-                <a:cs typeface="Lucida Console" charset="0"/>
-              </a:rPr>
-              <a:t>// </a:t>
-            </a:r>
-            <a:r>
-              <a:rPr lang="en-US" dirty="0">
-                <a:solidFill>
-                  <a:schemeClr val="accent6"/>
-                </a:solidFill>
-                <a:latin typeface="Lucida Console" charset="0"/>
-                <a:ea typeface="Lucida Console" charset="0"/>
-                <a:cs typeface="Lucida Console" charset="0"/>
-              </a:rPr>
-              <a:t>0 or 1 car</a:t>
-            </a:r>
-            <a:endParaRPr lang="en-US" b="0" dirty="0" smtClean="0">
-              <a:solidFill>
-                <a:schemeClr val="accent6"/>
-              </a:solidFill>
-              <a:effectLst/>
-              <a:latin typeface="Lucida Console" charset="0"/>
-              <a:ea typeface="Lucida Console" charset="0"/>
-              <a:cs typeface="Lucida Console" charset="0"/>
-            </a:endParaRPr>
-          </a:p>
-          <a:p>
-            <a:pPr marL="0" indent="0">
-              <a:lnSpc>
-                <a:spcPct val="120000"/>
-              </a:lnSpc>
-              <a:buNone/>
-            </a:pPr>
-            <a:r>
-              <a:rPr lang="en-US" dirty="0">
-                <a:latin typeface="Lucida Console" charset="0"/>
-                <a:ea typeface="Lucida Console" charset="0"/>
-                <a:cs typeface="Lucida Console" charset="0"/>
-              </a:rPr>
-              <a:t>       </a:t>
-            </a:r>
-            <a:r>
-              <a:rPr lang="en-US" b="1" dirty="0">
-                <a:solidFill>
-                  <a:srgbClr val="0070C0"/>
-                </a:solidFill>
-                <a:latin typeface="Lucida Console" charset="0"/>
-                <a:ea typeface="Lucida Console" charset="0"/>
-                <a:cs typeface="Lucida Console" charset="0"/>
-              </a:rPr>
-              <a:t>else</a:t>
-            </a:r>
-            <a:endParaRPr lang="en-US" b="1" dirty="0" smtClean="0">
-              <a:solidFill>
-                <a:srgbClr val="0070C0"/>
-              </a:solidFill>
-              <a:effectLst/>
-              <a:latin typeface="Lucida Console" charset="0"/>
-              <a:ea typeface="Lucida Console" charset="0"/>
-              <a:cs typeface="Lucida Console" charset="0"/>
-            </a:endParaRPr>
-          </a:p>
-          <a:p>
-            <a:pPr marL="0" indent="0">
-              <a:lnSpc>
-                <a:spcPct val="120000"/>
-              </a:lnSpc>
-              <a:buNone/>
-            </a:pPr>
-            <a:r>
-              <a:rPr lang="en-US" dirty="0">
-                <a:latin typeface="Lucida Console" charset="0"/>
-                <a:ea typeface="Lucida Console" charset="0"/>
-                <a:cs typeface="Lucida Console" charset="0"/>
-              </a:rPr>
-              <a:t>          answer += </a:t>
-            </a:r>
-            <a:r>
-              <a:rPr lang="en-US" dirty="0" err="1">
-                <a:latin typeface="Lucida Console" charset="0"/>
-                <a:ea typeface="Lucida Console" charset="0"/>
-                <a:cs typeface="Lucida Console" charset="0"/>
-              </a:rPr>
-              <a:t>QuadList</a:t>
-            </a:r>
-            <a:r>
-              <a:rPr lang="en-US" dirty="0">
-                <a:latin typeface="Lucida Console" charset="0"/>
-                <a:ea typeface="Lucida Console" charset="0"/>
-                <a:cs typeface="Lucida Console" charset="0"/>
-              </a:rPr>
-              <a:t>(S, top left of </a:t>
-            </a:r>
-            <a:r>
-              <a:rPr lang="en-US" dirty="0" smtClean="0">
-                <a:latin typeface="Lucida Console" charset="0"/>
-                <a:ea typeface="Lucida Console" charset="0"/>
-                <a:cs typeface="Lucida Console" charset="0"/>
-              </a:rPr>
-              <a:t>X)</a:t>
-            </a:r>
-            <a:r>
-              <a:rPr lang="en-US" dirty="0">
-                <a:latin typeface="Lucida Console" charset="0"/>
-                <a:ea typeface="Lucida Console" charset="0"/>
-                <a:cs typeface="Lucida Console" charset="0"/>
-              </a:rPr>
-              <a:t/>
-            </a:r>
-            <a:br>
-              <a:rPr lang="en-US" dirty="0">
-                <a:latin typeface="Lucida Console" charset="0"/>
-                <a:ea typeface="Lucida Console" charset="0"/>
-                <a:cs typeface="Lucida Console" charset="0"/>
-              </a:rPr>
-            </a:br>
-            <a:r>
-              <a:rPr lang="en-US" dirty="0">
-                <a:latin typeface="Lucida Console" charset="0"/>
-                <a:ea typeface="Lucida Console" charset="0"/>
-                <a:cs typeface="Lucida Console" charset="0"/>
-              </a:rPr>
-              <a:t> </a:t>
-            </a:r>
-            <a:r>
-              <a:rPr lang="en-US" dirty="0" smtClean="0">
-                <a:latin typeface="Lucida Console" charset="0"/>
-                <a:ea typeface="Lucida Console" charset="0"/>
-                <a:cs typeface="Lucida Console" charset="0"/>
-              </a:rPr>
-              <a:t>         answer </a:t>
-            </a:r>
-            <a:r>
-              <a:rPr lang="en-US" dirty="0">
-                <a:latin typeface="Lucida Console" charset="0"/>
-                <a:ea typeface="Lucida Console" charset="0"/>
-                <a:cs typeface="Lucida Console" charset="0"/>
-              </a:rPr>
-              <a:t>+= </a:t>
-            </a:r>
-            <a:r>
-              <a:rPr lang="en-US" dirty="0" err="1">
-                <a:latin typeface="Lucida Console" charset="0"/>
-                <a:ea typeface="Lucida Console" charset="0"/>
-                <a:cs typeface="Lucida Console" charset="0"/>
-              </a:rPr>
-              <a:t>QuadList</a:t>
-            </a:r>
-            <a:r>
-              <a:rPr lang="en-US" dirty="0">
-                <a:latin typeface="Lucida Console" charset="0"/>
-                <a:ea typeface="Lucida Console" charset="0"/>
-                <a:cs typeface="Lucida Console" charset="0"/>
-              </a:rPr>
-              <a:t>(S, top right of </a:t>
-            </a:r>
-            <a:r>
-              <a:rPr lang="en-US" dirty="0" smtClean="0">
-                <a:latin typeface="Lucida Console" charset="0"/>
-                <a:ea typeface="Lucida Console" charset="0"/>
-                <a:cs typeface="Lucida Console" charset="0"/>
-              </a:rPr>
-              <a:t>X)</a:t>
-            </a:r>
-            <a:r>
-              <a:rPr lang="en-US" dirty="0">
-                <a:latin typeface="Lucida Console" charset="0"/>
-                <a:ea typeface="Lucida Console" charset="0"/>
-                <a:cs typeface="Lucida Console" charset="0"/>
-              </a:rPr>
-              <a:t/>
-            </a:r>
-            <a:br>
-              <a:rPr lang="en-US" dirty="0">
-                <a:latin typeface="Lucida Console" charset="0"/>
-                <a:ea typeface="Lucida Console" charset="0"/>
-                <a:cs typeface="Lucida Console" charset="0"/>
-              </a:rPr>
-            </a:br>
-            <a:r>
-              <a:rPr lang="en-US" dirty="0" smtClean="0">
-                <a:latin typeface="Lucida Console" charset="0"/>
-                <a:ea typeface="Lucida Console" charset="0"/>
-                <a:cs typeface="Lucida Console" charset="0"/>
-              </a:rPr>
-              <a:t>          answer </a:t>
-            </a:r>
-            <a:r>
-              <a:rPr lang="en-US" dirty="0">
-                <a:latin typeface="Lucida Console" charset="0"/>
-                <a:ea typeface="Lucida Console" charset="0"/>
-                <a:cs typeface="Lucida Console" charset="0"/>
-              </a:rPr>
-              <a:t>+= </a:t>
-            </a:r>
-            <a:r>
-              <a:rPr lang="en-US" dirty="0" err="1">
-                <a:latin typeface="Lucida Console" charset="0"/>
-                <a:ea typeface="Lucida Console" charset="0"/>
-                <a:cs typeface="Lucida Console" charset="0"/>
-              </a:rPr>
-              <a:t>QuadList</a:t>
-            </a:r>
-            <a:r>
-              <a:rPr lang="en-US" dirty="0">
-                <a:latin typeface="Lucida Console" charset="0"/>
-                <a:ea typeface="Lucida Console" charset="0"/>
-                <a:cs typeface="Lucida Console" charset="0"/>
-              </a:rPr>
-              <a:t>(S, bottom left of </a:t>
-            </a:r>
-            <a:r>
-              <a:rPr lang="en-US" dirty="0" smtClean="0">
-                <a:latin typeface="Lucida Console" charset="0"/>
-                <a:ea typeface="Lucida Console" charset="0"/>
-                <a:cs typeface="Lucida Console" charset="0"/>
-              </a:rPr>
-              <a:t>X)</a:t>
-            </a:r>
-            <a:r>
-              <a:rPr lang="en-US" dirty="0">
-                <a:latin typeface="Lucida Console" charset="0"/>
-                <a:ea typeface="Lucida Console" charset="0"/>
-                <a:cs typeface="Lucida Console" charset="0"/>
-              </a:rPr>
-              <a:t/>
-            </a:r>
-            <a:br>
-              <a:rPr lang="en-US" dirty="0">
-                <a:latin typeface="Lucida Console" charset="0"/>
-                <a:ea typeface="Lucida Console" charset="0"/>
-                <a:cs typeface="Lucida Console" charset="0"/>
-              </a:rPr>
-            </a:br>
-            <a:r>
-              <a:rPr lang="en-US" dirty="0" smtClean="0">
-                <a:latin typeface="Lucida Console" charset="0"/>
-                <a:ea typeface="Lucida Console" charset="0"/>
-                <a:cs typeface="Lucida Console" charset="0"/>
-              </a:rPr>
-              <a:t>          answer </a:t>
-            </a:r>
-            <a:r>
-              <a:rPr lang="en-US" dirty="0">
-                <a:latin typeface="Lucida Console" charset="0"/>
-                <a:ea typeface="Lucida Console" charset="0"/>
-                <a:cs typeface="Lucida Console" charset="0"/>
-              </a:rPr>
-              <a:t>+= </a:t>
-            </a:r>
-            <a:r>
-              <a:rPr lang="en-US" dirty="0" err="1">
-                <a:latin typeface="Lucida Console" charset="0"/>
-                <a:ea typeface="Lucida Console" charset="0"/>
-                <a:cs typeface="Lucida Console" charset="0"/>
-              </a:rPr>
-              <a:t>QuadList</a:t>
-            </a:r>
-            <a:r>
-              <a:rPr lang="en-US" dirty="0">
-                <a:latin typeface="Lucida Console" charset="0"/>
-                <a:ea typeface="Lucida Console" charset="0"/>
-                <a:cs typeface="Lucida Console" charset="0"/>
-              </a:rPr>
-              <a:t>(S, bottom right of X)</a:t>
-            </a:r>
-            <a:endParaRPr lang="en-US" b="0" dirty="0" smtClean="0">
-              <a:effectLst/>
-              <a:latin typeface="Lucida Console" charset="0"/>
-              <a:ea typeface="Lucida Console" charset="0"/>
-              <a:cs typeface="Lucida Console" charset="0"/>
-            </a:endParaRPr>
-          </a:p>
-          <a:p>
-            <a:pPr marL="0" indent="0">
-              <a:lnSpc>
-                <a:spcPct val="120000"/>
-              </a:lnSpc>
-              <a:buNone/>
-            </a:pPr>
-            <a:r>
-              <a:rPr lang="en-US" dirty="0">
-                <a:latin typeface="Lucida Console" charset="0"/>
-                <a:ea typeface="Lucida Console" charset="0"/>
-                <a:cs typeface="Lucida Console" charset="0"/>
-              </a:rPr>
-              <a:t>       </a:t>
-            </a:r>
-            <a:r>
-              <a:rPr lang="en-US" b="1" dirty="0" err="1">
-                <a:solidFill>
-                  <a:srgbClr val="0070C0"/>
-                </a:solidFill>
-                <a:latin typeface="Lucida Console" charset="0"/>
-                <a:ea typeface="Lucida Console" charset="0"/>
-                <a:cs typeface="Lucida Console" charset="0"/>
-              </a:rPr>
-              <a:t>endif</a:t>
-            </a:r>
-            <a:endParaRPr lang="en-US" b="1" dirty="0" smtClean="0">
-              <a:solidFill>
-                <a:srgbClr val="0070C0"/>
-              </a:solidFill>
-              <a:effectLst/>
-              <a:latin typeface="Lucida Console" charset="0"/>
-              <a:ea typeface="Lucida Console" charset="0"/>
-              <a:cs typeface="Lucida Console" charset="0"/>
-            </a:endParaRPr>
-          </a:p>
-          <a:p>
-            <a:pPr marL="0" indent="0">
-              <a:lnSpc>
-                <a:spcPct val="120000"/>
-              </a:lnSpc>
-              <a:buNone/>
-            </a:pPr>
-            <a:r>
-              <a:rPr lang="en-US" dirty="0">
-                <a:latin typeface="Lucida Console" charset="0"/>
-                <a:ea typeface="Lucida Console" charset="0"/>
-                <a:cs typeface="Lucida Console" charset="0"/>
-              </a:rPr>
-              <a:t>    </a:t>
-            </a:r>
-            <a:r>
-              <a:rPr lang="en-US" b="1" dirty="0" err="1" smtClean="0">
-                <a:solidFill>
-                  <a:srgbClr val="0070C0"/>
-                </a:solidFill>
-                <a:latin typeface="Lucida Console" charset="0"/>
-                <a:ea typeface="Lucida Console" charset="0"/>
-                <a:cs typeface="Lucida Console" charset="0"/>
-              </a:rPr>
-              <a:t>endif</a:t>
-            </a:r>
-            <a:endParaRPr lang="en-US" b="1" dirty="0" smtClean="0">
-              <a:solidFill>
-                <a:srgbClr val="0070C0"/>
-              </a:solidFill>
-              <a:effectLst/>
-              <a:latin typeface="Lucida Console" charset="0"/>
-              <a:ea typeface="Lucida Console" charset="0"/>
-              <a:cs typeface="Lucida Console" charset="0"/>
-            </a:endParaRPr>
-          </a:p>
-          <a:p>
-            <a:pPr marL="0" indent="0">
-              <a:lnSpc>
-                <a:spcPct val="120000"/>
-              </a:lnSpc>
-              <a:buNone/>
-            </a:pPr>
-            <a:r>
-              <a:rPr lang="en-US" dirty="0">
-                <a:latin typeface="Lucida Console" charset="0"/>
-                <a:ea typeface="Lucida Console" charset="0"/>
-                <a:cs typeface="Lucida Console" charset="0"/>
-              </a:rPr>
-              <a:t>    </a:t>
-            </a:r>
-            <a:r>
-              <a:rPr lang="en-US" b="1" dirty="0">
-                <a:solidFill>
-                  <a:srgbClr val="0070C0"/>
-                </a:solidFill>
-                <a:latin typeface="Lucida Console" charset="0"/>
-                <a:ea typeface="Lucida Console" charset="0"/>
-                <a:cs typeface="Lucida Console" charset="0"/>
-              </a:rPr>
-              <a:t>return</a:t>
-            </a:r>
-            <a:r>
-              <a:rPr lang="en-US" dirty="0">
-                <a:latin typeface="Lucida Console" charset="0"/>
-                <a:ea typeface="Lucida Console" charset="0"/>
-                <a:cs typeface="Lucida Console" charset="0"/>
-              </a:rPr>
-              <a:t> </a:t>
-            </a:r>
-            <a:r>
-              <a:rPr lang="en-US" dirty="0" smtClean="0">
-                <a:latin typeface="Lucida Console" charset="0"/>
-                <a:ea typeface="Lucida Console" charset="0"/>
-                <a:cs typeface="Lucida Console" charset="0"/>
-              </a:rPr>
-              <a:t>answer</a:t>
-            </a:r>
-            <a:endParaRPr lang="en-US" dirty="0">
-              <a:latin typeface="Lucida Console" charset="0"/>
-              <a:ea typeface="Lucida Console" charset="0"/>
-              <a:cs typeface="Lucida Console" charset="0"/>
-            </a:endParaRPr>
-          </a:p>
-        </p:txBody>
-      </p:sp>
+      </p:pic>
     </p:spTree>
     <p:extLst>
       <p:ext uri="{BB962C8B-B14F-4D97-AF65-F5344CB8AC3E}">
-        <p14:creationId xmlns:p14="http://schemas.microsoft.com/office/powerpoint/2010/main" val="482448687"/>
+        <p14:creationId xmlns:p14="http://schemas.microsoft.com/office/powerpoint/2010/main" val="1377093511"/>
       </p:ext>
     </p:extLst>
   </p:cSld>
@@ -5927,36 +6350,34 @@
             <p:ph type="title"/>
           </p:nvPr>
         </p:nvSpPr>
-        <p:spPr>
-          <a:xfrm>
-            <a:off x="2152650" y="673470"/>
-            <a:ext cx="7886700" cy="1325563"/>
-          </a:xfrm>
-        </p:spPr>
+        <p:spPr/>
         <p:txBody>
           <a:bodyPr/>
           <a:lstStyle/>
           <a:p>
-            <a:pPr algn="ctr"/>
-            <a:r>
-              <a:rPr lang="en-US" dirty="0" smtClean="0">
-                <a:latin typeface="Impact" charset="0"/>
-                <a:ea typeface="Impact" charset="0"/>
-                <a:cs typeface="Impact" charset="0"/>
-              </a:rPr>
-              <a:t>We’re done.</a:t>
-            </a:r>
-            <a:endParaRPr lang="en-US" dirty="0">
-              <a:latin typeface="Impact" charset="0"/>
-              <a:ea typeface="Impact" charset="0"/>
-              <a:cs typeface="Impact" charset="0"/>
-            </a:endParaRPr>
+            <a:r>
+              <a:rPr lang="en-US" dirty="0"/>
+              <a:t>List </a:t>
+            </a:r>
+            <a:r>
+              <a:rPr lang="en-US" dirty="0" smtClean="0"/>
+              <a:t>all cars </a:t>
+            </a:r>
+            <a:r>
+              <a:rPr lang="en-US" dirty="0"/>
+              <a:t>in a given </a:t>
+            </a:r>
+            <a:r>
+              <a:rPr lang="en-US" dirty="0" smtClean="0"/>
+              <a:t>area – Step 2</a:t>
+            </a:r>
+            <a:endParaRPr lang="en-US" dirty="0"/>
           </a:p>
         </p:txBody>
       </p:sp>
       <p:pic>
         <p:nvPicPr>
-          <p:cNvPr id="8" name="Content Placeholder 7"/>
+          <p:cNvPr id="4" name="Content Placeholder 3"/>
           <p:cNvPicPr>
             <a:picLocks noGrp="1" noChangeAspect="1"/>
           </p:cNvPicPr>
@@ -5964,7 +6385,7 @@
             <p:ph idx="1"/>
           </p:nvPr>
         </p:nvPicPr>
-        <p:blipFill rotWithShape="1">
+        <p:blipFill>
           <a:blip r:embed="rId2">
             <a:extLst>
               <a:ext uri="{28A0092B-C50C-407E-A947-70E740481C1C}">
@@ -5972,91 +6393,27 @@
               </a:ext>
             </a:extLst>
           </a:blip>
-          <a:srcRect b="18802"/>
-          <a:stretch/>
+          <a:stretch>
+            <a:fillRect/>
+          </a:stretch>
         </p:blipFill>
         <p:spPr>
           <a:xfrm>
-            <a:off x="2614930" y="1690689"/>
-            <a:ext cx="6962140" cy="3533184"/>
+            <a:off x="3900000" y="1690688"/>
+            <a:ext cx="4392000" cy="4392000"/>
           </a:xfrm>
         </p:spPr>
       </p:pic>
-      <p:sp>
-        <p:nvSpPr>
-          <p:cNvPr id="9" name="Title 1"/>
-          <p:cNvSpPr txBox="1">
-            <a:spLocks/>
-          </p:cNvSpPr>
-          <p:nvPr/>
-        </p:nvSpPr>
-        <p:spPr>
-          <a:xfrm>
-            <a:off x="2152650" y="4972566"/>
-            <a:ext cx="7886700" cy="1325563"/>
-          </a:xfrm>
-          <a:prstGeom prst="rect">
-            <a:avLst/>
-          </a:prstGeom>
-        </p:spPr>
-        <p:txBody>
-          <a:bodyPr vert="horz" lIns="91440" tIns="45720" rIns="91440" bIns="45720" rtlCol="0" anchor="ctr">
-            <a:normAutofit/>
-          </a:bodyPr>
-          <a:lstStyle>
-            <a:lvl1pPr algn="l" defTabSz="914400" rtl="0" eaLnBrk="1" latinLnBrk="0" hangingPunct="1">
-              <a:lnSpc>
-                <a:spcPct val="90000"/>
-              </a:lnSpc>
-              <a:spcBef>
-                <a:spcPct val="0"/>
-              </a:spcBef>
-              <a:buNone/>
-              <a:defRPr sz="4400" kern="1200">
-                <a:solidFill>
-                  <a:schemeClr val="tx1"/>
-                </a:solidFill>
-                <a:latin typeface="+mj-lt"/>
-                <a:ea typeface="+mj-ea"/>
-                <a:cs typeface="+mj-cs"/>
-              </a:defRPr>
-            </a:lvl1pPr>
-          </a:lstStyle>
-          <a:p>
-            <a:pPr algn="ctr"/>
-            <a:r>
-              <a:rPr lang="en-US" dirty="0">
-                <a:latin typeface="Impact" charset="0"/>
-                <a:ea typeface="Impact" charset="0"/>
-                <a:cs typeface="Impact" charset="0"/>
-              </a:rPr>
-              <a:t>Any questions?</a:t>
-            </a:r>
-            <a:endParaRPr lang="en-US" dirty="0">
-              <a:latin typeface="Impact" charset="0"/>
-              <a:ea typeface="Impact" charset="0"/>
-              <a:cs typeface="Impact" charset="0"/>
-            </a:endParaRPr>
-          </a:p>
-        </p:txBody>
-      </p:sp>
     </p:spTree>
     <p:extLst>
       <p:ext uri="{BB962C8B-B14F-4D97-AF65-F5344CB8AC3E}">
-        <p14:creationId xmlns:p14="http://schemas.microsoft.com/office/powerpoint/2010/main" val="1382357205"/>
+        <p14:creationId xmlns:p14="http://schemas.microsoft.com/office/powerpoint/2010/main" val="1430767714"/>
       </p:ext>
     </p:extLst>
   </p:cSld>
   <p:clrMapOvr>
     <a:masterClrMapping/>
   </p:clrMapOvr>
-  <p:timing>
-    <p:tnLst>
-      <p:par>
-        <p:cTn id="1" dur="indefinite" restart="never" nodeType="tmRoot"/>
-      </p:par>
-    </p:tnLst>
-  </p:timing>
 </p:sld>
 </file>
 

</xml_diff>